<commit_message>
% adicionada aos resumo dos testes
</commit_message>
<xml_diff>
--- a/Avaliação de testes.pptx
+++ b/Avaliação de testes.pptx
@@ -115,7 +115,7 @@
   </p:defaultTextStyle>
   <p:extLst>
     <p:ext uri="{EFAFB233-063F-42B5-8137-9DF3F51BA10A}">
-      <p15:sldGuideLst xmlns:p15="http://schemas.microsoft.com/office/powerpoint/2012/main" xmlns="">
+      <p15:sldGuideLst xmlns="" xmlns:p15="http://schemas.microsoft.com/office/powerpoint/2012/main">
         <p15:guide id="1" orient="horz" pos="2160">
           <p15:clr>
             <a:srgbClr val="A4A3A4"/>
@@ -314,7 +314,7 @@
             <a:fld id="{F4448136-D4BD-40DD-93D0-3AD44E3A349C}" type="datetimeFigureOut">
               <a:rPr lang="pt-BR" smtClean="0"/>
               <a:pPr/>
-              <a:t>16/11/2014</a:t>
+              <a:t>17/11/2014</a:t>
             </a:fld>
             <a:endParaRPr lang="pt-BR"/>
           </a:p>
@@ -357,7 +357,7 @@
             <a:fld id="{CB49BECD-ADCE-4BA6-928B-AFA5749442EB}" type="slidenum">
               <a:rPr lang="pt-BR" smtClean="0"/>
               <a:pPr/>
-              <a:t>‹#›</a:t>
+              <a:t>‹nº›</a:t>
             </a:fld>
             <a:endParaRPr lang="pt-BR"/>
           </a:p>
@@ -481,7 +481,7 @@
             <a:fld id="{F4448136-D4BD-40DD-93D0-3AD44E3A349C}" type="datetimeFigureOut">
               <a:rPr lang="pt-BR" smtClean="0"/>
               <a:pPr/>
-              <a:t>16/11/2014</a:t>
+              <a:t>17/11/2014</a:t>
             </a:fld>
             <a:endParaRPr lang="pt-BR"/>
           </a:p>
@@ -524,7 +524,7 @@
             <a:fld id="{CB49BECD-ADCE-4BA6-928B-AFA5749442EB}" type="slidenum">
               <a:rPr lang="pt-BR" smtClean="0"/>
               <a:pPr/>
-              <a:t>‹#›</a:t>
+              <a:t>‹nº›</a:t>
             </a:fld>
             <a:endParaRPr lang="pt-BR"/>
           </a:p>
@@ -658,7 +658,7 @@
             <a:fld id="{F4448136-D4BD-40DD-93D0-3AD44E3A349C}" type="datetimeFigureOut">
               <a:rPr lang="pt-BR" smtClean="0"/>
               <a:pPr/>
-              <a:t>16/11/2014</a:t>
+              <a:t>17/11/2014</a:t>
             </a:fld>
             <a:endParaRPr lang="pt-BR"/>
           </a:p>
@@ -701,7 +701,7 @@
             <a:fld id="{CB49BECD-ADCE-4BA6-928B-AFA5749442EB}" type="slidenum">
               <a:rPr lang="pt-BR" smtClean="0"/>
               <a:pPr/>
-              <a:t>‹#›</a:t>
+              <a:t>‹nº›</a:t>
             </a:fld>
             <a:endParaRPr lang="pt-BR"/>
           </a:p>
@@ -825,7 +825,7 @@
             <a:fld id="{F4448136-D4BD-40DD-93D0-3AD44E3A349C}" type="datetimeFigureOut">
               <a:rPr lang="pt-BR" smtClean="0"/>
               <a:pPr/>
-              <a:t>16/11/2014</a:t>
+              <a:t>17/11/2014</a:t>
             </a:fld>
             <a:endParaRPr lang="pt-BR"/>
           </a:p>
@@ -868,7 +868,7 @@
             <a:fld id="{CB49BECD-ADCE-4BA6-928B-AFA5749442EB}" type="slidenum">
               <a:rPr lang="pt-BR" smtClean="0"/>
               <a:pPr/>
-              <a:t>‹#›</a:t>
+              <a:t>‹nº›</a:t>
             </a:fld>
             <a:endParaRPr lang="pt-BR"/>
           </a:p>
@@ -1068,7 +1068,7 @@
             <a:fld id="{F4448136-D4BD-40DD-93D0-3AD44E3A349C}" type="datetimeFigureOut">
               <a:rPr lang="pt-BR" smtClean="0"/>
               <a:pPr/>
-              <a:t>16/11/2014</a:t>
+              <a:t>17/11/2014</a:t>
             </a:fld>
             <a:endParaRPr lang="pt-BR"/>
           </a:p>
@@ -1111,7 +1111,7 @@
             <a:fld id="{CB49BECD-ADCE-4BA6-928B-AFA5749442EB}" type="slidenum">
               <a:rPr lang="pt-BR" smtClean="0"/>
               <a:pPr/>
-              <a:t>‹#›</a:t>
+              <a:t>‹nº›</a:t>
             </a:fld>
             <a:endParaRPr lang="pt-BR"/>
           </a:p>
@@ -1353,7 +1353,7 @@
             <a:fld id="{F4448136-D4BD-40DD-93D0-3AD44E3A349C}" type="datetimeFigureOut">
               <a:rPr lang="pt-BR" smtClean="0"/>
               <a:pPr/>
-              <a:t>16/11/2014</a:t>
+              <a:t>17/11/2014</a:t>
             </a:fld>
             <a:endParaRPr lang="pt-BR"/>
           </a:p>
@@ -1396,7 +1396,7 @@
             <a:fld id="{CB49BECD-ADCE-4BA6-928B-AFA5749442EB}" type="slidenum">
               <a:rPr lang="pt-BR" smtClean="0"/>
               <a:pPr/>
-              <a:t>‹#›</a:t>
+              <a:t>‹nº›</a:t>
             </a:fld>
             <a:endParaRPr lang="pt-BR"/>
           </a:p>
@@ -1772,7 +1772,7 @@
             <a:fld id="{F4448136-D4BD-40DD-93D0-3AD44E3A349C}" type="datetimeFigureOut">
               <a:rPr lang="pt-BR" smtClean="0"/>
               <a:pPr/>
-              <a:t>16/11/2014</a:t>
+              <a:t>17/11/2014</a:t>
             </a:fld>
             <a:endParaRPr lang="pt-BR"/>
           </a:p>
@@ -1815,7 +1815,7 @@
             <a:fld id="{CB49BECD-ADCE-4BA6-928B-AFA5749442EB}" type="slidenum">
               <a:rPr lang="pt-BR" smtClean="0"/>
               <a:pPr/>
-              <a:t>‹#›</a:t>
+              <a:t>‹nº›</a:t>
             </a:fld>
             <a:endParaRPr lang="pt-BR"/>
           </a:p>
@@ -1887,7 +1887,7 @@
             <a:fld id="{F4448136-D4BD-40DD-93D0-3AD44E3A349C}" type="datetimeFigureOut">
               <a:rPr lang="pt-BR" smtClean="0"/>
               <a:pPr/>
-              <a:t>16/11/2014</a:t>
+              <a:t>17/11/2014</a:t>
             </a:fld>
             <a:endParaRPr lang="pt-BR"/>
           </a:p>
@@ -1930,7 +1930,7 @@
             <a:fld id="{CB49BECD-ADCE-4BA6-928B-AFA5749442EB}" type="slidenum">
               <a:rPr lang="pt-BR" smtClean="0"/>
               <a:pPr/>
-              <a:t>‹#›</a:t>
+              <a:t>‹nº›</a:t>
             </a:fld>
             <a:endParaRPr lang="pt-BR"/>
           </a:p>
@@ -1979,7 +1979,7 @@
             <a:fld id="{F4448136-D4BD-40DD-93D0-3AD44E3A349C}" type="datetimeFigureOut">
               <a:rPr lang="pt-BR" smtClean="0"/>
               <a:pPr/>
-              <a:t>16/11/2014</a:t>
+              <a:t>17/11/2014</a:t>
             </a:fld>
             <a:endParaRPr lang="pt-BR"/>
           </a:p>
@@ -2022,7 +2022,7 @@
             <a:fld id="{CB49BECD-ADCE-4BA6-928B-AFA5749442EB}" type="slidenum">
               <a:rPr lang="pt-BR" smtClean="0"/>
               <a:pPr/>
-              <a:t>‹#›</a:t>
+              <a:t>‹nº›</a:t>
             </a:fld>
             <a:endParaRPr lang="pt-BR"/>
           </a:p>
@@ -2253,7 +2253,7 @@
             <a:fld id="{F4448136-D4BD-40DD-93D0-3AD44E3A349C}" type="datetimeFigureOut">
               <a:rPr lang="pt-BR" smtClean="0"/>
               <a:pPr/>
-              <a:t>16/11/2014</a:t>
+              <a:t>17/11/2014</a:t>
             </a:fld>
             <a:endParaRPr lang="pt-BR"/>
           </a:p>
@@ -2296,7 +2296,7 @@
             <a:fld id="{CB49BECD-ADCE-4BA6-928B-AFA5749442EB}" type="slidenum">
               <a:rPr lang="pt-BR" smtClean="0"/>
               <a:pPr/>
-              <a:t>‹#›</a:t>
+              <a:t>‹nº›</a:t>
             </a:fld>
             <a:endParaRPr lang="pt-BR"/>
           </a:p>
@@ -2503,7 +2503,7 @@
             <a:fld id="{F4448136-D4BD-40DD-93D0-3AD44E3A349C}" type="datetimeFigureOut">
               <a:rPr lang="pt-BR" smtClean="0"/>
               <a:pPr/>
-              <a:t>16/11/2014</a:t>
+              <a:t>17/11/2014</a:t>
             </a:fld>
             <a:endParaRPr lang="pt-BR"/>
           </a:p>
@@ -2546,7 +2546,7 @@
             <a:fld id="{CB49BECD-ADCE-4BA6-928B-AFA5749442EB}" type="slidenum">
               <a:rPr lang="pt-BR" smtClean="0"/>
               <a:pPr/>
-              <a:t>‹#›</a:t>
+              <a:t>‹nº›</a:t>
             </a:fld>
             <a:endParaRPr lang="pt-BR"/>
           </a:p>
@@ -2713,7 +2713,7 @@
             <a:fld id="{F4448136-D4BD-40DD-93D0-3AD44E3A349C}" type="datetimeFigureOut">
               <a:rPr lang="pt-BR" smtClean="0"/>
               <a:pPr/>
-              <a:t>16/11/2014</a:t>
+              <a:t>17/11/2014</a:t>
             </a:fld>
             <a:endParaRPr lang="pt-BR"/>
           </a:p>
@@ -2792,7 +2792,7 @@
             <a:fld id="{CB49BECD-ADCE-4BA6-928B-AFA5749442EB}" type="slidenum">
               <a:rPr lang="pt-BR" smtClean="0"/>
               <a:pPr/>
-              <a:t>‹#›</a:t>
+              <a:t>‹nº›</a:t>
             </a:fld>
             <a:endParaRPr lang="pt-BR"/>
           </a:p>
@@ -3093,7 +3093,7 @@
           <p:nvPr/>
         </p:nvPicPr>
         <p:blipFill>
-          <a:blip r:embed="rId2"/>
+          <a:blip r:embed="rId2" cstate="print"/>
           <a:stretch>
             <a:fillRect/>
           </a:stretch>
@@ -3210,7 +3210,7 @@
           <p:nvPr/>
         </p:nvPicPr>
         <p:blipFill>
-          <a:blip r:embed="rId2"/>
+          <a:blip r:embed="rId2" cstate="print"/>
           <a:stretch>
             <a:fillRect/>
           </a:stretch>
@@ -3268,7 +3268,7 @@
           </p:nvPr>
         </p:nvPicPr>
         <p:blipFill>
-          <a:blip r:embed="rId2"/>
+          <a:blip r:embed="rId2" cstate="print"/>
           <a:stretch>
             <a:fillRect/>
           </a:stretch>
@@ -3413,7 +3413,7 @@
           </p:nvPr>
         </p:nvPicPr>
         <p:blipFill>
-          <a:blip r:embed="rId2"/>
+          <a:blip r:embed="rId2" cstate="print"/>
           <a:stretch>
             <a:fillRect/>
           </a:stretch>
@@ -3509,13 +3509,8 @@
             </a:pPr>
             <a:r>
               <a:rPr lang="pt-BR" dirty="0" smtClean="0"/>
-              <a:t>Módulo 1: </a:t>
-            </a:r>
-            <a:r>
-              <a:rPr lang="pt-BR" dirty="0" smtClean="0"/>
-              <a:t>Cadastrar</a:t>
-            </a:r>
-            <a:endParaRPr lang="pt-BR" dirty="0" smtClean="0"/>
+              <a:t>Módulo 1: Cadastrar</a:t>
+            </a:r>
           </a:p>
           <a:p>
             <a:pPr marL="742950" lvl="1" indent="-285750">
@@ -3524,13 +3519,8 @@
             </a:pPr>
             <a:r>
               <a:rPr lang="pt-BR" dirty="0" smtClean="0"/>
-              <a:t>Módulo 2:  </a:t>
-            </a:r>
-            <a:r>
-              <a:rPr lang="pt-BR" dirty="0" smtClean="0"/>
-              <a:t>Alterar</a:t>
-            </a:r>
-            <a:endParaRPr lang="pt-BR" dirty="0" smtClean="0"/>
+              <a:t>Módulo 2:  Alterar</a:t>
+            </a:r>
           </a:p>
           <a:p>
             <a:pPr marL="742950" lvl="1" indent="-285750">
@@ -3539,13 +3529,8 @@
             </a:pPr>
             <a:r>
               <a:rPr lang="pt-BR" dirty="0" smtClean="0"/>
-              <a:t>Módulo 3 : </a:t>
-            </a:r>
-            <a:r>
-              <a:rPr lang="pt-BR" dirty="0" smtClean="0"/>
-              <a:t>Excluir</a:t>
-            </a:r>
-            <a:endParaRPr lang="pt-BR" dirty="0" smtClean="0"/>
+              <a:t>Módulo 3 : Excluir</a:t>
+            </a:r>
           </a:p>
           <a:p>
             <a:pPr marL="742950" lvl="1" indent="-285750">
@@ -3554,11 +3539,7 @@
             </a:pPr>
             <a:r>
               <a:rPr lang="pt-BR" dirty="0" smtClean="0"/>
-              <a:t>Módulo 4: </a:t>
-            </a:r>
-            <a:r>
-              <a:rPr lang="pt-BR" dirty="0" smtClean="0"/>
-              <a:t>Buscar</a:t>
+              <a:t>Módulo 4: Buscar</a:t>
             </a:r>
             <a:endParaRPr lang="pt-BR" dirty="0"/>
           </a:p>
@@ -3607,7 +3588,7 @@
           </p:nvPr>
         </p:nvPicPr>
         <p:blipFill>
-          <a:blip r:embed="rId2"/>
+          <a:blip r:embed="rId2" cstate="print"/>
           <a:stretch>
             <a:fillRect/>
           </a:stretch>
@@ -3667,7 +3648,7 @@
         <p:spPr>
           <a:xfrm>
             <a:off x="1115616" y="1857364"/>
-            <a:ext cx="6929486" cy="3693319"/>
+            <a:ext cx="6929486" cy="2308324"/>
           </a:xfrm>
           <a:prstGeom prst="rect">
             <a:avLst/>
@@ -3707,7 +3688,14 @@
               <a:buFont typeface="+mj-lt"/>
               <a:buAutoNum type="arabicPeriod"/>
             </a:pPr>
-            <a:endParaRPr lang="pt-BR" dirty="0" smtClean="0"/>
+            <a:r>
+              <a:rPr lang="pt-BR" dirty="0" smtClean="0"/>
+              <a:t>Teste </a:t>
+            </a:r>
+            <a:r>
+              <a:rPr lang="pt-BR" dirty="0" smtClean="0"/>
+              <a:t>Funcional</a:t>
+            </a:r>
           </a:p>
           <a:p>
             <a:pPr marL="342900" indent="-342900">
@@ -3716,7 +3704,11 @@
             </a:pPr>
             <a:r>
               <a:rPr lang="pt-BR" dirty="0" smtClean="0"/>
-              <a:t>Teste Funcional</a:t>
+              <a:t>Teste </a:t>
+            </a:r>
+            <a:r>
+              <a:rPr lang="pt-BR" dirty="0" smtClean="0"/>
+              <a:t>da Interface do Usuário</a:t>
             </a:r>
           </a:p>
           <a:p>
@@ -3724,7 +3716,14 @@
               <a:buFont typeface="+mj-lt"/>
               <a:buAutoNum type="arabicPeriod"/>
             </a:pPr>
-            <a:endParaRPr lang="pt-BR" dirty="0" smtClean="0"/>
+            <a:r>
+              <a:rPr lang="pt-BR" dirty="0" smtClean="0"/>
+              <a:t>Teste </a:t>
+            </a:r>
+            <a:r>
+              <a:rPr lang="pt-BR" dirty="0" smtClean="0"/>
+              <a:t>de Performance</a:t>
+            </a:r>
           </a:p>
           <a:p>
             <a:pPr marL="342900" indent="-342900">
@@ -3733,7 +3732,11 @@
             </a:pPr>
             <a:r>
               <a:rPr lang="pt-BR" dirty="0" smtClean="0"/>
-              <a:t>Teste da Interface do Usuário</a:t>
+              <a:t>Teste </a:t>
+            </a:r>
+            <a:r>
+              <a:rPr lang="pt-BR" dirty="0" smtClean="0"/>
+              <a:t>de instalação</a:t>
             </a:r>
           </a:p>
           <a:p>
@@ -3741,64 +3744,21 @@
               <a:buFont typeface="+mj-lt"/>
               <a:buAutoNum type="arabicPeriod"/>
             </a:pPr>
-            <a:endParaRPr lang="pt-BR" dirty="0" smtClean="0"/>
-          </a:p>
-          <a:p>
-            <a:pPr marL="342900" indent="-342900">
-              <a:buFont typeface="+mj-lt"/>
-              <a:buAutoNum type="arabicPeriod"/>
-            </a:pPr>
             <a:r>
               <a:rPr lang="pt-BR" dirty="0" smtClean="0"/>
-              <a:t>Teste de Performance</a:t>
-            </a:r>
-          </a:p>
-          <a:p>
-            <a:pPr marL="342900" indent="-342900">
-              <a:buFont typeface="+mj-lt"/>
-              <a:buAutoNum type="arabicPeriod"/>
-            </a:pPr>
-            <a:endParaRPr lang="pt-BR" dirty="0" smtClean="0"/>
-          </a:p>
-          <a:p>
-            <a:pPr marL="342900" indent="-342900">
-              <a:buFont typeface="+mj-lt"/>
-              <a:buAutoNum type="arabicPeriod"/>
-            </a:pPr>
+              <a:t>Teste </a:t>
+            </a:r>
             <a:r>
               <a:rPr lang="pt-BR" dirty="0" smtClean="0"/>
-              <a:t>Teste de instalação</a:t>
-            </a:r>
-            <a:endParaRPr lang="pt-BR" dirty="0" smtClean="0"/>
-          </a:p>
-          <a:p>
-            <a:pPr marL="342900" indent="-342900">
-              <a:buFont typeface="+mj-lt"/>
-              <a:buAutoNum type="arabicPeriod"/>
-            </a:pPr>
-            <a:endParaRPr lang="pt-BR" dirty="0" smtClean="0"/>
-          </a:p>
-          <a:p>
-            <a:pPr marL="342900" indent="-342900">
-              <a:buFont typeface="+mj-lt"/>
-              <a:buAutoNum type="arabicPeriod"/>
-            </a:pPr>
-            <a:r>
-              <a:rPr lang="pt-BR" dirty="0" smtClean="0"/>
-              <a:t>Teste de </a:t>
-            </a:r>
-            <a:r>
-              <a:rPr lang="pt-BR" dirty="0" smtClean="0"/>
-              <a:t>configuração</a:t>
-            </a:r>
-            <a:endParaRPr lang="pt-BR" dirty="0" smtClean="0"/>
+              <a:t>de configuração</a:t>
+            </a:r>
           </a:p>
         </p:txBody>
       </p:sp>
     </p:spTree>
     <p:extLst>
       <p:ext uri="{BB962C8B-B14F-4D97-AF65-F5344CB8AC3E}">
-        <p14:creationId xmlns:p14="http://schemas.microsoft.com/office/powerpoint/2010/main" val="2159869430"/>
+        <p14:creationId xmlns:p14="http://schemas.microsoft.com/office/powerpoint/2010/main" xmlns="" val="2159869430"/>
       </p:ext>
     </p:extLst>
   </p:cSld>
@@ -3843,7 +3803,7 @@
           </p:nvPr>
         </p:nvPicPr>
         <p:blipFill>
-          <a:blip r:embed="rId2"/>
+          <a:blip r:embed="rId2" cstate="print"/>
           <a:stretch>
             <a:fillRect/>
           </a:stretch>
@@ -3884,15 +3844,7 @@
                   <a:schemeClr val="bg1"/>
                 </a:solidFill>
               </a:rPr>
-              <a:t>Módulo </a:t>
-            </a:r>
-            <a:r>
-              <a:rPr lang="pt-BR" sz="2800" dirty="0" smtClean="0">
-                <a:solidFill>
-                  <a:schemeClr val="bg1"/>
-                </a:solidFill>
-              </a:rPr>
-              <a:t>Cadastrar</a:t>
+              <a:t>Módulo Cadastrar</a:t>
             </a:r>
             <a:endParaRPr lang="pt-BR" sz="2800" dirty="0">
               <a:solidFill>
@@ -3932,6 +3884,23 @@
               <a:rPr lang="pt-BR" dirty="0" smtClean="0"/>
               <a:t>28</a:t>
             </a:r>
+          </a:p>
+          <a:p>
+            <a:endParaRPr lang="pt-BR" b="1" dirty="0" smtClean="0"/>
+          </a:p>
+          <a:p>
+            <a:r>
+              <a:rPr lang="pt-BR" b="1" dirty="0" smtClean="0"/>
+              <a:t>Casos </a:t>
+            </a:r>
+            <a:r>
+              <a:rPr lang="pt-BR" b="1" dirty="0" smtClean="0"/>
+              <a:t>de testes executados: </a:t>
+            </a:r>
+            <a:r>
+              <a:rPr lang="pt-BR" dirty="0" smtClean="0"/>
+              <a:t>28 – 100%</a:t>
+            </a:r>
             <a:endParaRPr lang="pt-BR" dirty="0" smtClean="0"/>
           </a:p>
           <a:p>
@@ -3940,47 +3909,45 @@
           <a:p>
             <a:r>
               <a:rPr lang="pt-BR" b="1" dirty="0" smtClean="0"/>
-              <a:t>Casos de testes executados: </a:t>
+              <a:t>Aprovados</a:t>
+            </a:r>
+            <a:r>
+              <a:rPr lang="pt-BR" b="1" dirty="0" smtClean="0"/>
+              <a:t>: </a:t>
             </a:r>
             <a:r>
               <a:rPr lang="pt-BR" dirty="0" smtClean="0"/>
-              <a:t>28</a:t>
+              <a:t>20 – 72%</a:t>
             </a:r>
             <a:endParaRPr lang="pt-BR" dirty="0" smtClean="0"/>
           </a:p>
           <a:p>
+            <a:r>
+              <a:rPr lang="pt-BR" b="1" dirty="0" smtClean="0"/>
+              <a:t>Reprovados</a:t>
+            </a:r>
+            <a:r>
+              <a:rPr lang="pt-BR" b="1" dirty="0" smtClean="0"/>
+              <a:t>: </a:t>
+            </a:r>
+            <a:r>
+              <a:rPr lang="pt-BR" dirty="0" smtClean="0"/>
+              <a:t>7 – 25,2%</a:t>
+            </a:r>
             <a:endParaRPr lang="pt-BR" dirty="0" smtClean="0"/>
           </a:p>
           <a:p>
             <a:r>
               <a:rPr lang="pt-BR" b="1" dirty="0" smtClean="0"/>
-              <a:t>Aprovados: </a:t>
+              <a:t>Melhorias</a:t>
+            </a:r>
+            <a:r>
+              <a:rPr lang="pt-BR" b="1" dirty="0" smtClean="0"/>
+              <a:t>: </a:t>
             </a:r>
             <a:r>
               <a:rPr lang="pt-BR" dirty="0" smtClean="0"/>
-              <a:t>20</a:t>
-            </a:r>
-            <a:endParaRPr lang="pt-BR" dirty="0" smtClean="0"/>
-          </a:p>
-          <a:p>
-            <a:r>
-              <a:rPr lang="pt-BR" b="1" dirty="0" smtClean="0"/>
-              <a:t>Reprovados: </a:t>
-            </a:r>
-            <a:r>
-              <a:rPr lang="pt-BR" dirty="0" smtClean="0"/>
-              <a:t>7</a:t>
-            </a:r>
-            <a:endParaRPr lang="pt-BR" dirty="0" smtClean="0"/>
-          </a:p>
-          <a:p>
-            <a:r>
-              <a:rPr lang="pt-BR" b="1" dirty="0" smtClean="0"/>
-              <a:t>Melhorias: </a:t>
-            </a:r>
-            <a:r>
-              <a:rPr lang="pt-BR" dirty="0"/>
-              <a:t>1</a:t>
+              <a:t>1 – 3,8% </a:t>
             </a:r>
             <a:endParaRPr lang="pt-BR" dirty="0" smtClean="0"/>
           </a:p>
@@ -4035,7 +4002,7 @@
           </p:nvPr>
         </p:nvPicPr>
         <p:blipFill>
-          <a:blip r:embed="rId2"/>
+          <a:blip r:embed="rId2" cstate="print"/>
           <a:stretch>
             <a:fillRect/>
           </a:stretch>
@@ -4076,15 +4043,7 @@
                   <a:schemeClr val="bg1"/>
                 </a:solidFill>
               </a:rPr>
-              <a:t>Módulo </a:t>
-            </a:r>
-            <a:r>
-              <a:rPr lang="pt-BR" sz="2800" dirty="0" smtClean="0">
-                <a:solidFill>
-                  <a:schemeClr val="bg1"/>
-                </a:solidFill>
-              </a:rPr>
-              <a:t>Alterar</a:t>
+              <a:t>Módulo Alterar</a:t>
             </a:r>
             <a:endParaRPr lang="pt-BR" sz="2800" dirty="0">
               <a:solidFill>
@@ -4124,7 +4083,6 @@
               <a:rPr lang="pt-BR" dirty="0" smtClean="0"/>
               <a:t>14</a:t>
             </a:r>
-            <a:endParaRPr lang="pt-BR" dirty="0" smtClean="0"/>
           </a:p>
           <a:p>
             <a:endParaRPr lang="pt-BR" dirty="0" smtClean="0"/>
@@ -4136,7 +4094,7 @@
             </a:r>
             <a:r>
               <a:rPr lang="pt-BR" dirty="0" smtClean="0"/>
-              <a:t>14</a:t>
+              <a:t>14 – 100%</a:t>
             </a:r>
             <a:endParaRPr lang="pt-BR" dirty="0" smtClean="0"/>
           </a:p>
@@ -4149,8 +4107,8 @@
               <a:t>Aprovados: </a:t>
             </a:r>
             <a:r>
-              <a:rPr lang="pt-BR" dirty="0"/>
-              <a:t>5</a:t>
+              <a:rPr lang="pt-BR" dirty="0" smtClean="0"/>
+              <a:t>5 – 35,75%</a:t>
             </a:r>
             <a:endParaRPr lang="pt-BR" dirty="0" smtClean="0"/>
           </a:p>
@@ -4160,8 +4118,8 @@
               <a:t>Reprovados: </a:t>
             </a:r>
             <a:r>
-              <a:rPr lang="pt-BR" dirty="0"/>
-              <a:t>3</a:t>
+              <a:rPr lang="pt-BR" dirty="0" smtClean="0"/>
+              <a:t>3 – 21,45%</a:t>
             </a:r>
             <a:endParaRPr lang="pt-BR" dirty="0" smtClean="0"/>
           </a:p>
@@ -4171,8 +4129,8 @@
               <a:t>Melhorias: </a:t>
             </a:r>
             <a:r>
-              <a:rPr lang="pt-BR" dirty="0"/>
-              <a:t>6</a:t>
+              <a:rPr lang="pt-BR" dirty="0" smtClean="0"/>
+              <a:t>6 – 42,8%</a:t>
             </a:r>
             <a:endParaRPr lang="pt-BR" dirty="0" smtClean="0"/>
           </a:p>
@@ -4221,7 +4179,7 @@
           </p:nvPr>
         </p:nvPicPr>
         <p:blipFill>
-          <a:blip r:embed="rId2"/>
+          <a:blip r:embed="rId2" cstate="print"/>
           <a:stretch>
             <a:fillRect/>
           </a:stretch>
@@ -4262,15 +4220,7 @@
                   <a:schemeClr val="bg1"/>
                 </a:solidFill>
               </a:rPr>
-              <a:t>Módulo </a:t>
-            </a:r>
-            <a:r>
-              <a:rPr lang="pt-BR" sz="2800" dirty="0" smtClean="0">
-                <a:solidFill>
-                  <a:schemeClr val="bg1"/>
-                </a:solidFill>
-              </a:rPr>
-              <a:t>Excluir</a:t>
+              <a:t>Módulo Excluir</a:t>
             </a:r>
             <a:endParaRPr lang="pt-BR" sz="2800" dirty="0">
               <a:solidFill>
@@ -4322,7 +4272,7 @@
             </a:r>
             <a:r>
               <a:rPr lang="pt-BR" dirty="0" smtClean="0"/>
-              <a:t>2</a:t>
+              <a:t>2 – 100%</a:t>
             </a:r>
             <a:endParaRPr lang="pt-BR" dirty="0" smtClean="0"/>
           </a:p>
@@ -4335,8 +4285,8 @@
               <a:t>Aprovados: </a:t>
             </a:r>
             <a:r>
-              <a:rPr lang="pt-BR" dirty="0"/>
-              <a:t>1</a:t>
+              <a:rPr lang="pt-BR" dirty="0" smtClean="0"/>
+              <a:t>1 – 50%</a:t>
             </a:r>
             <a:endParaRPr lang="pt-BR" dirty="0" smtClean="0"/>
           </a:p>
@@ -4356,8 +4306,8 @@
               <a:t>Melhorias: </a:t>
             </a:r>
             <a:r>
-              <a:rPr lang="pt-BR" dirty="0"/>
-              <a:t>1</a:t>
+              <a:rPr lang="pt-BR" dirty="0" smtClean="0"/>
+              <a:t>1 – 50%</a:t>
             </a:r>
             <a:endParaRPr lang="pt-BR" dirty="0" smtClean="0"/>
           </a:p>
@@ -4406,7 +4356,7 @@
           </p:nvPr>
         </p:nvPicPr>
         <p:blipFill>
-          <a:blip r:embed="rId2"/>
+          <a:blip r:embed="rId2" cstate="print"/>
           <a:stretch>
             <a:fillRect/>
           </a:stretch>
@@ -4447,15 +4397,7 @@
                   <a:schemeClr val="bg1"/>
                 </a:solidFill>
               </a:rPr>
-              <a:t>Módulo </a:t>
-            </a:r>
-            <a:r>
-              <a:rPr lang="pt-BR" sz="2800" dirty="0" smtClean="0">
-                <a:solidFill>
-                  <a:schemeClr val="bg1"/>
-                </a:solidFill>
-              </a:rPr>
-              <a:t>Buscar</a:t>
+              <a:t>Módulo Buscar</a:t>
             </a:r>
             <a:endParaRPr lang="pt-BR" sz="2800" dirty="0">
               <a:solidFill>
@@ -4506,10 +4448,9 @@
               <a:t>Casos de testes executados: </a:t>
             </a:r>
             <a:r>
-              <a:rPr lang="pt-BR" dirty="0"/>
-              <a:t>3</a:t>
-            </a:r>
-            <a:endParaRPr lang="pt-BR" dirty="0" smtClean="0"/>
+              <a:rPr lang="pt-BR" dirty="0" smtClean="0"/>
+              <a:t>3 – 100%</a:t>
+            </a:r>
           </a:p>
           <a:p>
             <a:endParaRPr lang="pt-BR" dirty="0" smtClean="0"/>
@@ -4521,8 +4462,9 @@
             </a:r>
             <a:r>
               <a:rPr lang="pt-BR" dirty="0" smtClean="0"/>
-              <a:t>1</a:t>
-            </a:r>
+              <a:t>1  - 33,3%</a:t>
+            </a:r>
+            <a:endParaRPr lang="pt-BR" dirty="0" smtClean="0"/>
           </a:p>
           <a:p>
             <a:r>
@@ -4531,8 +4473,9 @@
             </a:r>
             <a:r>
               <a:rPr lang="pt-BR" dirty="0" smtClean="0"/>
-              <a:t>0</a:t>
-            </a:r>
+              <a:t>0 - </a:t>
+            </a:r>
+            <a:endParaRPr lang="pt-BR" dirty="0" smtClean="0"/>
           </a:p>
           <a:p>
             <a:r>
@@ -4540,8 +4483,8 @@
               <a:t>Melhorias: </a:t>
             </a:r>
             <a:r>
-              <a:rPr lang="pt-BR" dirty="0"/>
-              <a:t>2</a:t>
+              <a:rPr lang="pt-BR" dirty="0" smtClean="0"/>
+              <a:t>2 - 66,7%</a:t>
             </a:r>
             <a:endParaRPr lang="pt-BR" dirty="0" smtClean="0"/>
           </a:p>
@@ -4590,7 +4533,7 @@
           </p:nvPr>
         </p:nvPicPr>
         <p:blipFill>
-          <a:blip r:embed="rId2"/>
+          <a:blip r:embed="rId2" cstate="print"/>
           <a:stretch>
             <a:fillRect/>
           </a:stretch>
@@ -4687,23 +4630,7 @@
             </a:r>
             <a:r>
               <a:rPr lang="pt-BR" dirty="0" smtClean="0"/>
-              <a:t>e avaliação dos testes, além de outros documentos, como o de </a:t>
-            </a:r>
-            <a:r>
-              <a:rPr lang="pt-BR" dirty="0" smtClean="0"/>
-              <a:t>solicitação </a:t>
-            </a:r>
-            <a:r>
-              <a:rPr lang="pt-BR" dirty="0" smtClean="0"/>
-              <a:t>de </a:t>
-            </a:r>
-            <a:r>
-              <a:rPr lang="pt-BR" dirty="0" smtClean="0"/>
-              <a:t>mudanças</a:t>
-            </a:r>
-            <a:r>
-              <a:rPr lang="pt-BR" dirty="0" smtClean="0"/>
-              <a:t>;</a:t>
+              <a:t>e avaliação dos testes, além de outros documentos, como o de solicitação de mudanças;</a:t>
             </a:r>
           </a:p>
           <a:p>
@@ -4741,13 +4668,8 @@
             </a:pPr>
             <a:r>
               <a:rPr lang="pt-BR" dirty="0" smtClean="0"/>
-              <a:t>Notebook com Windows 8 </a:t>
-            </a:r>
-            <a:r>
-              <a:rPr lang="pt-BR" dirty="0" smtClean="0"/>
-              <a:t>instalado, java 8;</a:t>
-            </a:r>
-            <a:endParaRPr lang="pt-BR" dirty="0" smtClean="0"/>
+              <a:t>Notebook com Windows 8 instalado, java 8;</a:t>
+            </a:r>
           </a:p>
           <a:p>
             <a:pPr marL="800100" lvl="1" indent="-342900">
@@ -4756,17 +4678,8 @@
             </a:pPr>
             <a:r>
               <a:rPr lang="pt-BR" dirty="0" smtClean="0"/>
-              <a:t>Desktop </a:t>
-            </a:r>
-            <a:r>
-              <a:rPr lang="pt-BR" dirty="0" smtClean="0"/>
-              <a:t>com Windows 7 </a:t>
-            </a:r>
-            <a:r>
-              <a:rPr lang="pt-BR" dirty="0" smtClean="0"/>
-              <a:t>instalado, java 8;</a:t>
-            </a:r>
-            <a:endParaRPr lang="pt-BR" dirty="0" smtClean="0"/>
+              <a:t>Desktop com Windows 7 instalado, java 8;</a:t>
+            </a:r>
           </a:p>
           <a:p>
             <a:pPr lvl="1"/>
@@ -4796,7 +4709,7 @@
     </p:spTree>
     <p:extLst>
       <p:ext uri="{BB962C8B-B14F-4D97-AF65-F5344CB8AC3E}">
-        <p14:creationId xmlns:p14="http://schemas.microsoft.com/office/powerpoint/2010/main" val="385561133"/>
+        <p14:creationId xmlns:p14="http://schemas.microsoft.com/office/powerpoint/2010/main" xmlns="" val="385561133"/>
       </p:ext>
     </p:extLst>
   </p:cSld>

</xml_diff>